<commit_message>
split chapters into files, reorged chapter 2
</commit_message>
<xml_diff>
--- a/Figures/Thesis Figures/Airfoil.pptx
+++ b/Figures/Thesis Figures/Airfoil.pptx
@@ -7,6 +7,7 @@
   <p:sldIdLst>
     <p:sldId id="256" r:id="rId2"/>
     <p:sldId id="257" r:id="rId3"/>
+    <p:sldId id="258" r:id="rId4"/>
   </p:sldIdLst>
   <p:sldSz cx="12192000" cy="6858000"/>
   <p:notesSz cx="6858000" cy="9144000"/>
@@ -260,7 +261,7 @@
           <a:p>
             <a:fld id="{00525D04-D4E8-42ED-8CF7-FDC7B3039D34}" type="datetimeFigureOut">
               <a:rPr lang="en-US" smtClean="0"/>
-              <a:t>8/6/23</a:t>
+              <a:t>8/10/2023</a:t>
             </a:fld>
             <a:endParaRPr lang="en-US"/>
           </a:p>
@@ -458,7 +459,7 @@
           <a:p>
             <a:fld id="{00525D04-D4E8-42ED-8CF7-FDC7B3039D34}" type="datetimeFigureOut">
               <a:rPr lang="en-US" smtClean="0"/>
-              <a:t>8/6/23</a:t>
+              <a:t>8/10/2023</a:t>
             </a:fld>
             <a:endParaRPr lang="en-US"/>
           </a:p>
@@ -666,7 +667,7 @@
           <a:p>
             <a:fld id="{00525D04-D4E8-42ED-8CF7-FDC7B3039D34}" type="datetimeFigureOut">
               <a:rPr lang="en-US" smtClean="0"/>
-              <a:t>8/6/23</a:t>
+              <a:t>8/10/2023</a:t>
             </a:fld>
             <a:endParaRPr lang="en-US"/>
           </a:p>
@@ -864,7 +865,7 @@
           <a:p>
             <a:fld id="{00525D04-D4E8-42ED-8CF7-FDC7B3039D34}" type="datetimeFigureOut">
               <a:rPr lang="en-US" smtClean="0"/>
-              <a:t>8/6/23</a:t>
+              <a:t>8/10/2023</a:t>
             </a:fld>
             <a:endParaRPr lang="en-US"/>
           </a:p>
@@ -1139,7 +1140,7 @@
           <a:p>
             <a:fld id="{00525D04-D4E8-42ED-8CF7-FDC7B3039D34}" type="datetimeFigureOut">
               <a:rPr lang="en-US" smtClean="0"/>
-              <a:t>8/6/23</a:t>
+              <a:t>8/10/2023</a:t>
             </a:fld>
             <a:endParaRPr lang="en-US"/>
           </a:p>
@@ -1404,7 +1405,7 @@
           <a:p>
             <a:fld id="{00525D04-D4E8-42ED-8CF7-FDC7B3039D34}" type="datetimeFigureOut">
               <a:rPr lang="en-US" smtClean="0"/>
-              <a:t>8/6/23</a:t>
+              <a:t>8/10/2023</a:t>
             </a:fld>
             <a:endParaRPr lang="en-US"/>
           </a:p>
@@ -1816,7 +1817,7 @@
           <a:p>
             <a:fld id="{00525D04-D4E8-42ED-8CF7-FDC7B3039D34}" type="datetimeFigureOut">
               <a:rPr lang="en-US" smtClean="0"/>
-              <a:t>8/6/23</a:t>
+              <a:t>8/10/2023</a:t>
             </a:fld>
             <a:endParaRPr lang="en-US"/>
           </a:p>
@@ -1957,7 +1958,7 @@
           <a:p>
             <a:fld id="{00525D04-D4E8-42ED-8CF7-FDC7B3039D34}" type="datetimeFigureOut">
               <a:rPr lang="en-US" smtClean="0"/>
-              <a:t>8/6/23</a:t>
+              <a:t>8/10/2023</a:t>
             </a:fld>
             <a:endParaRPr lang="en-US"/>
           </a:p>
@@ -2070,7 +2071,7 @@
           <a:p>
             <a:fld id="{00525D04-D4E8-42ED-8CF7-FDC7B3039D34}" type="datetimeFigureOut">
               <a:rPr lang="en-US" smtClean="0"/>
-              <a:t>8/6/23</a:t>
+              <a:t>8/10/2023</a:t>
             </a:fld>
             <a:endParaRPr lang="en-US"/>
           </a:p>
@@ -2381,7 +2382,7 @@
           <a:p>
             <a:fld id="{00525D04-D4E8-42ED-8CF7-FDC7B3039D34}" type="datetimeFigureOut">
               <a:rPr lang="en-US" smtClean="0"/>
-              <a:t>8/6/23</a:t>
+              <a:t>8/10/2023</a:t>
             </a:fld>
             <a:endParaRPr lang="en-US"/>
           </a:p>
@@ -2669,7 +2670,7 @@
           <a:p>
             <a:fld id="{00525D04-D4E8-42ED-8CF7-FDC7B3039D34}" type="datetimeFigureOut">
               <a:rPr lang="en-US" smtClean="0"/>
-              <a:t>8/6/23</a:t>
+              <a:t>8/10/2023</a:t>
             </a:fld>
             <a:endParaRPr lang="en-US"/>
           </a:p>
@@ -2910,7 +2911,7 @@
           <a:p>
             <a:fld id="{00525D04-D4E8-42ED-8CF7-FDC7B3039D34}" type="datetimeFigureOut">
               <a:rPr lang="en-US" smtClean="0"/>
-              <a:t>8/6/23</a:t>
+              <a:t>8/10/2023</a:t>
             </a:fld>
             <a:endParaRPr lang="en-US"/>
           </a:p>
@@ -3676,6 +3677,128 @@
 </p:sld>
 </file>
 
+<file path=ppt/slides/slide3.xml><?xml version="1.0" encoding="utf-8"?>
+<p:sld xmlns:a="http://schemas.openxmlformats.org/drawingml/2006/main" xmlns:r="http://schemas.openxmlformats.org/officeDocument/2006/relationships" xmlns:p="http://schemas.openxmlformats.org/presentationml/2006/main">
+  <p:cSld>
+    <p:spTree>
+      <p:nvGrpSpPr>
+        <p:cNvPr id="1" name=""/>
+        <p:cNvGrpSpPr/>
+        <p:nvPr/>
+      </p:nvGrpSpPr>
+      <p:grpSpPr>
+        <a:xfrm>
+          <a:off x="0" y="0"/>
+          <a:ext cx="0" cy="0"/>
+          <a:chOff x="0" y="0"/>
+          <a:chExt cx="0" cy="0"/>
+        </a:xfrm>
+      </p:grpSpPr>
+      <p:grpSp>
+        <p:nvGrpSpPr>
+          <p:cNvPr id="8" name="Group 7">
+            <a:extLst>
+              <a:ext uri="{FF2B5EF4-FFF2-40B4-BE49-F238E27FC236}">
+                <a16:creationId xmlns:a16="http://schemas.microsoft.com/office/drawing/2014/main" id="{6FB4CA92-3BF9-F19A-BFD4-A484656A67C9}"/>
+              </a:ext>
+            </a:extLst>
+          </p:cNvPr>
+          <p:cNvGrpSpPr/>
+          <p:nvPr/>
+        </p:nvGrpSpPr>
+        <p:grpSpPr>
+          <a:xfrm>
+            <a:off x="-69030" y="1514690"/>
+            <a:ext cx="11827892" cy="3337560"/>
+            <a:chOff x="-69030" y="1514690"/>
+            <a:chExt cx="11827892" cy="3337560"/>
+          </a:xfrm>
+        </p:grpSpPr>
+        <p:pic>
+          <p:nvPicPr>
+            <p:cNvPr id="5" name="Picture 4">
+              <a:extLst>
+                <a:ext uri="{FF2B5EF4-FFF2-40B4-BE49-F238E27FC236}">
+                  <a16:creationId xmlns:a16="http://schemas.microsoft.com/office/drawing/2014/main" id="{B7124C53-21D7-9794-BE7E-AA7F1BDE8C8D}"/>
+                </a:ext>
+              </a:extLst>
+            </p:cNvPr>
+            <p:cNvPicPr>
+              <a:picLocks noChangeAspect="1"/>
+            </p:cNvPicPr>
+            <p:nvPr/>
+          </p:nvPicPr>
+          <p:blipFill rotWithShape="1">
+            <a:blip r:embed="rId2">
+              <a:extLst>
+                <a:ext uri="{28A0092B-C50C-407E-A947-70E740481C1C}">
+                  <a14:useLocalDpi xmlns:a14="http://schemas.microsoft.com/office/drawing/2010/main" val="0"/>
+                </a:ext>
+              </a:extLst>
+            </a:blip>
+            <a:srcRect r="9360"/>
+            <a:stretch/>
+          </p:blipFill>
+          <p:spPr>
+            <a:xfrm>
+              <a:off x="5590673" y="1518689"/>
+              <a:ext cx="6168189" cy="3333561"/>
+            </a:xfrm>
+            <a:prstGeom prst="rect">
+              <a:avLst/>
+            </a:prstGeom>
+          </p:spPr>
+        </p:pic>
+        <p:pic>
+          <p:nvPicPr>
+            <p:cNvPr id="7" name="Picture 6">
+              <a:extLst>
+                <a:ext uri="{FF2B5EF4-FFF2-40B4-BE49-F238E27FC236}">
+                  <a16:creationId xmlns:a16="http://schemas.microsoft.com/office/drawing/2014/main" id="{286F2EB8-AB9F-AEF6-ADF9-17900272BF5F}"/>
+                </a:ext>
+              </a:extLst>
+            </p:cNvPr>
+            <p:cNvPicPr>
+              <a:picLocks noChangeAspect="1"/>
+            </p:cNvPicPr>
+            <p:nvPr/>
+          </p:nvPicPr>
+          <p:blipFill>
+            <a:blip r:embed="rId3">
+              <a:extLst>
+                <a:ext uri="{28A0092B-C50C-407E-A947-70E740481C1C}">
+                  <a14:useLocalDpi xmlns:a14="http://schemas.microsoft.com/office/drawing/2010/main" val="0"/>
+                </a:ext>
+              </a:extLst>
+            </a:blip>
+            <a:stretch>
+              <a:fillRect/>
+            </a:stretch>
+          </p:blipFill>
+          <p:spPr>
+            <a:xfrm>
+              <a:off x="-69030" y="1514690"/>
+              <a:ext cx="6758821" cy="3337560"/>
+            </a:xfrm>
+            <a:prstGeom prst="rect">
+              <a:avLst/>
+            </a:prstGeom>
+          </p:spPr>
+        </p:pic>
+      </p:grpSp>
+    </p:spTree>
+    <p:extLst>
+      <p:ext uri="{BB962C8B-B14F-4D97-AF65-F5344CB8AC3E}">
+        <p14:creationId xmlns:p14="http://schemas.microsoft.com/office/powerpoint/2010/main" val="1136940888"/>
+      </p:ext>
+    </p:extLst>
+  </p:cSld>
+  <p:clrMapOvr>
+    <a:masterClrMapping/>
+  </p:clrMapOvr>
+</p:sld>
+</file>
+
 <file path=ppt/theme/theme1.xml><?xml version="1.0" encoding="utf-8"?>
 <a:theme xmlns:a="http://schemas.openxmlformats.org/drawingml/2006/main" name="Office Theme">
   <a:themeElements>

</xml_diff>